<commit_message>
Updated decorator sequence diagram; updated slide
</commit_message>
<xml_diff>
--- a/Sermina/Slide/DP version 1.2.pptx
+++ b/Sermina/Slide/DP version 1.2.pptx
@@ -1055,7 +1055,7 @@
               <a:defRPr/>
             </a:pPr>
             <a:r>
-              <a:rPr lang="en-US" sz="1200" kern="1200" smtClean="0">
+              <a:rPr lang="en-US" sz="1200" kern="1200">
                 <a:solidFill>
                   <a:schemeClr val="tx1"/>
                 </a:solidFill>
@@ -1069,7 +1069,7 @@
           </a:p>
           <a:p>
             <a:r>
-              <a:rPr lang="en-US" sz="1200" kern="1200" smtClean="0">
+              <a:rPr lang="en-US" sz="1200" kern="1200">
                 <a:solidFill>
                   <a:schemeClr val="tx1"/>
                 </a:solidFill>
@@ -1083,7 +1083,7 @@
           </a:p>
           <a:p>
             <a:r>
-              <a:rPr lang="en-US" sz="1200" kern="1200" smtClean="0">
+              <a:rPr lang="en-US" sz="1200" kern="1200">
                 <a:solidFill>
                   <a:schemeClr val="tx1"/>
                 </a:solidFill>
@@ -1179,7 +1179,7 @@
           <a:lstStyle/>
           <a:p>
             <a:r>
-              <a:rPr lang="en-US" sz="1200" kern="1200" smtClean="0">
+              <a:rPr lang="en-US" sz="1200" kern="1200">
                 <a:solidFill>
                   <a:schemeClr val="tx1"/>
                 </a:solidFill>
@@ -1193,7 +1193,7 @@
           </a:p>
           <a:p>
             <a:r>
-              <a:rPr lang="en-US" sz="1200" kern="1200" smtClean="0">
+              <a:rPr lang="en-US" sz="1200" kern="1200">
                 <a:solidFill>
                   <a:schemeClr val="tx1"/>
                 </a:solidFill>
@@ -1207,7 +1207,7 @@
           </a:p>
           <a:p>
             <a:r>
-              <a:rPr lang="en-US" sz="1200" kern="1200" smtClean="0">
+              <a:rPr lang="en-US" sz="1200" kern="1200">
                 <a:solidFill>
                   <a:schemeClr val="tx1"/>
                 </a:solidFill>
@@ -1221,7 +1221,7 @@
           </a:p>
           <a:p>
             <a:r>
-              <a:rPr lang="en-US" sz="1200" kern="1200" smtClean="0">
+              <a:rPr lang="en-US" sz="1200" kern="1200">
                 <a:solidFill>
                   <a:schemeClr val="tx1"/>
                 </a:solidFill>
@@ -1234,11 +1234,11 @@
             </a:r>
           </a:p>
           <a:p>
-            <a:endParaRPr lang="en-US" smtClean="0"/>
-          </a:p>
-          <a:p>
-            <a:r>
-              <a:rPr lang="en-US" sz="1200" kern="1200" smtClean="0">
+            <a:endParaRPr lang="en-US"/>
+          </a:p>
+          <a:p>
+            <a:r>
+              <a:rPr lang="en-US" sz="1200" kern="1200">
                 <a:solidFill>
                   <a:schemeClr val="tx1"/>
                 </a:solidFill>
@@ -1252,7 +1252,7 @@
           </a:p>
           <a:p>
             <a:r>
-              <a:rPr lang="en-US" sz="1200" kern="1200" smtClean="0">
+              <a:rPr lang="en-US" sz="1200" kern="1200">
                 <a:solidFill>
                   <a:schemeClr val="tx1"/>
                 </a:solidFill>
@@ -1263,12 +1263,8 @@
               </a:rPr>
               <a:t>Điều này đặc biệt quan trọng trong các chương trình xử lí văn bản hay các trình duyệt Web khi chúng đặt các dòng chữ nằm xung quanh các bức ảnh thậm chí trước khi cả tấm ảnh đó được hiển </a:t>
             </a:r>
-            <a:r>
-              <a:rPr lang="en-US" smtClean="0"/>
-              <a:t/>
-            </a:r>
             <a:br>
-              <a:rPr lang="en-US" smtClean="0"/>
+              <a:rPr lang="en-US"/>
             </a:br>
             <a:endParaRPr lang="en-US"/>
           </a:p>
@@ -1354,20 +1350,8 @@
           <a:bodyPr/>
           <a:lstStyle/>
           <a:p>
-            <a:r>
-              <a:rPr lang="vi-VN" sz="1200" b="1" i="0" kern="1200" smtClean="0">
-                <a:solidFill>
-                  <a:schemeClr val="tx1"/>
-                </a:solidFill>
-                <a:effectLst/>
-                <a:latin typeface="+mn-lt"/>
-                <a:ea typeface="+mn-ea"/>
-                <a:cs typeface="+mn-cs"/>
-              </a:rPr>
-              <a:t/>
-            </a:r>
             <a:br>
-              <a:rPr lang="vi-VN" sz="1200" b="1" i="0" kern="1200" smtClean="0">
+              <a:rPr lang="vi-VN" sz="1200" b="1" i="0" kern="1200">
                 <a:solidFill>
                   <a:schemeClr val="tx1"/>
                 </a:solidFill>
@@ -1473,29 +1457,8 @@
               </a:rPr>
               <a:t>A client obtains a reference to a Proxy, the client then handles the proxy in the same way it handles RealSubject and thus invoking the method doSomething(). </a:t>
             </a:r>
-            <a:endParaRPr lang="en-US" sz="1200" b="0" i="0" kern="1200" smtClean="0">
-              <a:solidFill>
-                <a:schemeClr val="tx1"/>
-              </a:solidFill>
-              <a:effectLst/>
-              <a:latin typeface="+mn-lt"/>
-              <a:ea typeface="+mn-ea"/>
-              <a:cs typeface="+mn-cs"/>
-            </a:endParaRPr>
-          </a:p>
-          <a:p>
-            <a:r>
-              <a:rPr lang="en-US" sz="1200" b="0" i="0" kern="1200" smtClean="0">
-                <a:solidFill>
-                  <a:schemeClr val="tx1"/>
-                </a:solidFill>
-                <a:effectLst/>
-                <a:latin typeface="+mn-lt"/>
-                <a:ea typeface="+mn-ea"/>
-                <a:cs typeface="+mn-cs"/>
-              </a:rPr>
-              <a:t>At </a:t>
-            </a:r>
+          </a:p>
+          <a:p>
             <a:r>
               <a:rPr lang="en-US" sz="1200" b="0" i="0" kern="1200">
                 <a:solidFill>
@@ -1506,20 +1469,10 @@
                 <a:ea typeface="+mn-ea"/>
                 <a:cs typeface="+mn-cs"/>
               </a:rPr>
-              <a:t>that point the proxy can do different things prior to invoking </a:t>
-            </a:r>
-            <a:r>
-              <a:rPr lang="en-US" sz="1200" b="0" i="0" kern="1200" smtClean="0">
-                <a:solidFill>
-                  <a:schemeClr val="tx1"/>
-                </a:solidFill>
-                <a:effectLst/>
-                <a:latin typeface="+mn-lt"/>
-                <a:ea typeface="+mn-ea"/>
-                <a:cs typeface="+mn-cs"/>
-              </a:rPr>
-              <a:t>RealSubject’s </a:t>
-            </a:r>
+              <a:t>At that point the proxy can do different things prior to invoking RealSubject’s doSomething() method. </a:t>
+            </a:r>
+          </a:p>
+          <a:p>
             <a:r>
               <a:rPr lang="en-US" sz="1200" b="0" i="0" kern="1200">
                 <a:solidFill>
@@ -1530,31 +1483,10 @@
                 <a:ea typeface="+mn-ea"/>
                 <a:cs typeface="+mn-cs"/>
               </a:rPr>
-              <a:t>doSomething() method. </a:t>
-            </a:r>
-            <a:endParaRPr lang="en-US" sz="1200" b="0" i="0" kern="1200" smtClean="0">
-              <a:solidFill>
-                <a:schemeClr val="tx1"/>
-              </a:solidFill>
-              <a:effectLst/>
-              <a:latin typeface="+mn-lt"/>
-              <a:ea typeface="+mn-ea"/>
-              <a:cs typeface="+mn-cs"/>
-            </a:endParaRPr>
-          </a:p>
-          <a:p>
-            <a:r>
-              <a:rPr lang="en-US" sz="1200" b="0" i="0" kern="1200" smtClean="0">
-                <a:solidFill>
-                  <a:schemeClr val="tx1"/>
-                </a:solidFill>
-                <a:effectLst/>
-                <a:latin typeface="+mn-lt"/>
-                <a:ea typeface="+mn-ea"/>
-                <a:cs typeface="+mn-cs"/>
-              </a:rPr>
-              <a:t>The </a:t>
-            </a:r>
+              <a:t>The client might create a RealSubject object at that point, perform initialization, check permissions of the client to invoke the method, and then invoke the method on the object. </a:t>
+            </a:r>
+          </a:p>
+          <a:p>
             <a:r>
               <a:rPr lang="en-US" sz="1200" b="0" i="0" kern="1200">
                 <a:solidFill>
@@ -1565,42 +1497,7 @@
                 <a:ea typeface="+mn-ea"/>
                 <a:cs typeface="+mn-cs"/>
               </a:rPr>
-              <a:t>client might create a RealSubject object at that point, perform initialization, check permissions of the client to invoke the method, and then invoke the method on the object. </a:t>
-            </a:r>
-            <a:endParaRPr lang="en-US" sz="1200" b="0" i="0" kern="1200" smtClean="0">
-              <a:solidFill>
-                <a:schemeClr val="tx1"/>
-              </a:solidFill>
-              <a:effectLst/>
-              <a:latin typeface="+mn-lt"/>
-              <a:ea typeface="+mn-ea"/>
-              <a:cs typeface="+mn-cs"/>
-            </a:endParaRPr>
-          </a:p>
-          <a:p>
-            <a:r>
-              <a:rPr lang="en-US" sz="1200" b="0" i="0" kern="1200" smtClean="0">
-                <a:solidFill>
-                  <a:schemeClr val="tx1"/>
-                </a:solidFill>
-                <a:effectLst/>
-                <a:latin typeface="+mn-lt"/>
-                <a:ea typeface="+mn-ea"/>
-                <a:cs typeface="+mn-cs"/>
-              </a:rPr>
-              <a:t>The </a:t>
-            </a:r>
-            <a:r>
-              <a:rPr lang="en-US" sz="1200" b="0" i="0" kern="1200">
-                <a:solidFill>
-                  <a:schemeClr val="tx1"/>
-                </a:solidFill>
-                <a:effectLst/>
-                <a:latin typeface="+mn-lt"/>
-                <a:ea typeface="+mn-ea"/>
-                <a:cs typeface="+mn-cs"/>
-              </a:rPr>
-              <a:t>client can also do additional tasks after invoking the doSomething() method, such as incrementing the number of references to the object.</a:t>
+              <a:t>The client can also do additional tasks after invoking the doSomething() method, such as incrementing the number of references to the object.</a:t>
             </a:r>
             <a:endParaRPr lang="en-US"/>
           </a:p>
@@ -5609,21 +5506,13 @@
                   <a:schemeClr val="tx1"/>
                 </a:solidFill>
               </a:rPr>
-              <a:t>Nhóm trình bày: </a:t>
-            </a:r>
-            <a:r>
-              <a:rPr lang="en-US" smtClean="0">
-                <a:solidFill>
-                  <a:schemeClr val="tx1"/>
-                </a:solidFill>
-              </a:rPr>
-              <a:t>28</a:t>
+              <a:t>Nhóm trình bày: 28</a:t>
             </a:r>
           </a:p>
           <a:p>
             <a:pPr algn="ctr"/>
             <a:r>
-              <a:rPr lang="en-US" smtClean="0">
+              <a:rPr lang="en-US">
                 <a:solidFill>
                   <a:schemeClr val="tx1"/>
                 </a:solidFill>
@@ -5634,7 +5523,7 @@
           <a:p>
             <a:pPr algn="ctr"/>
             <a:r>
-              <a:rPr lang="en-US" smtClean="0">
+              <a:rPr lang="en-US">
                 <a:solidFill>
                   <a:schemeClr val="tx1"/>
                 </a:solidFill>
@@ -5645,7 +5534,7 @@
           <a:p>
             <a:pPr algn="ctr"/>
             <a:r>
-              <a:rPr lang="en-US" smtClean="0">
+              <a:rPr lang="en-US">
                 <a:solidFill>
                   <a:schemeClr val="tx1"/>
                 </a:solidFill>
@@ -5693,19 +5582,7 @@
               <a:rPr lang="en-US">
                 <a:latin typeface="Constantia" panose="02030602050306030303" pitchFamily="18" charset="0"/>
               </a:rPr>
-              <a:t>Trường ĐH Công nghệ </a:t>
-            </a:r>
-            <a:r>
-              <a:rPr lang="en-US" smtClean="0">
-                <a:latin typeface="Constantia" panose="02030602050306030303" pitchFamily="18" charset="0"/>
-              </a:rPr>
-              <a:t>Thông </a:t>
-            </a:r>
-            <a:r>
-              <a:rPr lang="en-US">
-                <a:latin typeface="Constantia" panose="02030602050306030303" pitchFamily="18" charset="0"/>
-              </a:rPr>
-              <a:t>tin - ĐHQG HCM</a:t>
+              <a:t>Trường ĐH Công nghệ Thông tin - ĐHQG HCM</a:t>
             </a:r>
             <a:endParaRPr lang="en-US" dirty="0">
               <a:latin typeface="Constantia" panose="02030602050306030303" pitchFamily="18" charset="0"/>
@@ -5735,13 +5612,6 @@
       </p:transition>
     </mc:Fallback>
   </mc:AlternateContent>
-  <p:timing>
-    <p:tnLst>
-      <p:par>
-        <p:cTn id="1" dur="indefinite" restart="never" nodeType="tmRoot"/>
-      </p:par>
-    </p:tnLst>
-  </p:timing>
 </p:sld>
 </file>
 
@@ -5852,46 +5722,16 @@
           <a:p>
             <a:pPr lvl="2"/>
             <a:r>
-              <a:rPr lang="en-US" sz="1800" smtClean="0"/>
-              <a:t>Là lớp thuần ảo có </a:t>
-            </a:r>
-            <a:r>
               <a:rPr lang="en-US" sz="1800"/>
-              <a:t>kiểu dữ liệu </a:t>
-            </a:r>
-            <a:r>
-              <a:rPr lang="en-US" sz="1800" smtClean="0"/>
-              <a:t>được kế thừa Component </a:t>
-            </a:r>
+              <a:t>Là lớp thuần ảo có kiểu dữ liệu được kế thừa Component và giữ một tham chiếu đến một đối tượng kiểu Component. </a:t>
+            </a:r>
+          </a:p>
+          <a:p>
+            <a:pPr lvl="2"/>
             <a:r>
               <a:rPr lang="en-US" sz="1800"/>
-              <a:t>và giữ một tham chiếu đến một đối tượng kiểu </a:t>
-            </a:r>
-            <a:r>
-              <a:rPr lang="en-US" sz="1800" smtClean="0"/>
-              <a:t>Component. </a:t>
-            </a:r>
-            <a:endParaRPr lang="en-US" sz="1800"/>
-          </a:p>
-          <a:p>
-            <a:pPr lvl="2"/>
-            <a:r>
-              <a:rPr lang="en-US" sz="1800"/>
-              <a:t>Định nghĩa một giao diện </a:t>
-            </a:r>
-            <a:r>
-              <a:rPr lang="en-US" sz="1800" smtClean="0"/>
-              <a:t>nhất </a:t>
-            </a:r>
-            <a:r>
-              <a:rPr lang="en-US" sz="1800"/>
-              <a:t>quán cho các Decorator hiện thực </a:t>
-            </a:r>
-            <a:r>
-              <a:rPr lang="en-US" sz="1800" smtClean="0"/>
-              <a:t>nó.</a:t>
-            </a:r>
-            <a:endParaRPr lang="en-US" sz="1800"/>
+              <a:t>Định nghĩa một giao diện nhất quán cho các Decorator hiện thực nó.</a:t>
+            </a:r>
           </a:p>
           <a:p>
             <a:pPr lvl="1"/>
@@ -5979,45 +5819,26 @@
       </p:sp>
       <p:pic>
         <p:nvPicPr>
-          <p:cNvPr id="13314" name="Picture 2" descr="Kết quả hình ảnh cho relation between components of decorator pattern"/>
+          <p:cNvPr id="4" name="Picture 3"/>
           <p:cNvPicPr>
-            <a:picLocks noGrp="1" noChangeAspect="1" noChangeArrowheads="1"/>
+            <a:picLocks noChangeAspect="1"/>
           </p:cNvPicPr>
-          <p:nvPr>
-            <p:ph idx="1"/>
-          </p:nvPr>
+          <p:nvPr/>
         </p:nvPicPr>
         <p:blipFill>
-          <a:blip r:embed="rId2">
-            <a:extLst>
-              <a:ext uri="{28A0092B-C50C-407E-A947-70E740481C1C}">
-                <a14:useLocalDpi xmlns:a14="http://schemas.microsoft.com/office/drawing/2010/main" val="0"/>
-              </a:ext>
-            </a:extLst>
-          </a:blip>
-          <a:srcRect/>
+          <a:blip r:embed="rId2"/>
           <a:stretch>
             <a:fillRect/>
           </a:stretch>
         </p:blipFill>
-        <p:spPr bwMode="auto">
+        <p:spPr>
           <a:xfrm>
-            <a:off x="3065040" y="2209800"/>
-            <a:ext cx="6058746" cy="3124636"/>
+            <a:off x="2295834" y="1905000"/>
+            <a:ext cx="7658100" cy="4067175"/>
           </a:xfrm>
           <a:prstGeom prst="rect">
             <a:avLst/>
           </a:prstGeom>
-          <a:noFill/>
-          <a:extLst>
-            <a:ext uri="{909E8E84-426E-40DD-AFC4-6F175D3DCCD1}">
-              <a14:hiddenFill xmlns:a14="http://schemas.microsoft.com/office/drawing/2010/main">
-                <a:solidFill>
-                  <a:srgbClr val="FFFFFF"/>
-                </a:solidFill>
-              </a14:hiddenFill>
-            </a:ext>
-          </a:extLst>
         </p:spPr>
       </p:pic>
     </p:spTree>
@@ -6119,28 +5940,23 @@
             <a:pPr lvl="1"/>
             <a:r>
               <a:rPr lang="vi-VN" sz="2000"/>
-              <a:t>Decorator đơn giản hóa mã bằng cách cho phép bạn để phát triển một loạt các chức năng từ ứng với các class tương ứng thay vì thêm tất cả các hành vi vào một đối tượng</a:t>
-            </a:r>
-            <a:r>
-              <a:rPr lang="vi-VN" sz="2000" smtClean="0"/>
-              <a:t>.</a:t>
-            </a:r>
-            <a:endParaRPr lang="en-US" sz="2000" smtClean="0"/>
+              <a:t>Decorator đơn giản hóa mã bằng cách cho phép bạn để phát triển một loạt các chức năng từ ứng với các class tương ứng thay vì thêm tất cả các hành vi vào một đối tượng.</a:t>
+            </a:r>
+            <a:endParaRPr lang="en-US" sz="2000"/>
           </a:p>
           <a:p>
             <a:pPr lvl="1"/>
             <a:r>
-              <a:rPr lang="en-US" sz="2000" smtClean="0"/>
+              <a:rPr lang="en-US" sz="2000"/>
               <a:t>Việc trang trí đối tượng bằng cách thêm vào các chức năng trong thời gian runtime làm cho việc debug chương trình khó khan hơn.</a:t>
             </a:r>
           </a:p>
           <a:p>
             <a:pPr lvl="1"/>
             <a:r>
-              <a:rPr lang="en-US" sz="2000" smtClean="0"/>
+              <a:rPr lang="en-US" sz="2000"/>
               <a:t>Việc tạo ra quá nhiều lớp con cho mỗi decorator làm cho vấn đề bảo trì code phức tạp hơn.</a:t>
             </a:r>
-            <a:endParaRPr lang="en-US" sz="2000"/>
           </a:p>
           <a:p>
             <a:pPr lvl="1"/>
@@ -6234,16 +6050,8 @@
               <a:buChar char="•"/>
             </a:pPr>
             <a:r>
-              <a:rPr lang="en-US" sz="2000" smtClean="0"/>
-              <a:t>Chỉ </a:t>
-            </a:r>
-            <a:r>
               <a:rPr lang="en-US" sz="2000"/>
-              <a:t>có duy nhất một đối tượng bên trong một Decorator, có thể có nhiều các tùy chọn trang trí hay các lớp bao, và có một giao diện chung cho chúng nhằm giúp cho các lớp có thể hoán đổi với nhau (interchangeable</a:t>
-            </a:r>
-            <a:r>
-              <a:rPr lang="en-US" sz="2000" smtClean="0"/>
-              <a:t>).</a:t>
+              <a:t>Chỉ có duy nhất một đối tượng bên trong một Decorator, có thể có nhiều các tùy chọn trang trí hay các lớp bao, và có một giao diện chung cho chúng nhằm giúp cho các lớp có thể hoán đổi với nhau (interchangeable).</a:t>
             </a:r>
           </a:p>
           <a:p>
@@ -6252,7 +6060,7 @@
               <a:buChar char="•"/>
             </a:pPr>
             <a:r>
-              <a:rPr lang="en-US" sz="2000" smtClean="0"/>
+              <a:rPr lang="en-US" sz="2000"/>
               <a:t>Các decorator cần phải giữ một tham chiếu đến một đối tượng có thực thi giao diện gốc mà chúng kế thừa từ đó, đối tượng đó phải được khởi tạo trong hàm khởi tạo của decorator.</a:t>
             </a:r>
           </a:p>
@@ -6262,7 +6070,7 @@
               <a:buChar char="•"/>
             </a:pPr>
             <a:r>
-              <a:rPr lang="en-US" sz="2000" smtClean="0"/>
+              <a:rPr lang="en-US" sz="2000"/>
               <a:t>Định nghĩa một decorator cho nhu cầu chọn trang trí một đối tượng nào đó.</a:t>
             </a:r>
           </a:p>
@@ -6272,7 +6080,7 @@
               <a:buChar char="•"/>
             </a:pPr>
             <a:r>
-              <a:rPr lang="en-US" sz="2000" smtClean="0"/>
+              <a:rPr lang="en-US" sz="2000"/>
               <a:t>Client (nơi sử dụng các decorator) sẽ quyết định đối tượng trung tâm nào sẽ được sử dụng và nó sẽ được trang trí bởi các decorator nào</a:t>
             </a:r>
           </a:p>
@@ -6281,7 +6089,7 @@
               <a:buFont typeface="Arial" panose="020B0604020202020204" pitchFamily="34" charset="0"/>
               <a:buChar char="•"/>
             </a:pPr>
-            <a:endParaRPr lang="en-US" sz="2000" smtClean="0"/>
+            <a:endParaRPr lang="en-US" sz="2000"/>
           </a:p>
           <a:p>
             <a:endParaRPr lang="en-US" sz="2000"/>
@@ -6371,24 +6179,23 @@
           <a:p>
             <a:pPr lvl="1"/>
             <a:r>
-              <a:rPr lang="en-US" sz="2000" smtClean="0"/>
+              <a:rPr lang="en-US" sz="2000"/>
               <a:t>Bài toán:</a:t>
             </a:r>
           </a:p>
           <a:p>
             <a:pPr lvl="1"/>
             <a:r>
-              <a:rPr lang="en-US" sz="2000" smtClean="0"/>
+              <a:rPr lang="en-US" sz="2000"/>
               <a:t>Một nhà hàng ẩm thực có thực đơn các món ăn bao gồm nhiều món khác nhau: đồ chay, đồ mặn, đồ thịt, v.v.. Khách hàng khi gọi món có thể them các tùy chọn khác nhau: ăn với đồ chay, kèm đồ uống với coca,… Khi đó giá tiền mà khách hàng phải trả sẽ bằng giá của món ăn đó và giá các phụ kiện kèm theo.</a:t>
             </a:r>
           </a:p>
           <a:p>
             <a:pPr lvl="1"/>
             <a:r>
-              <a:rPr lang="en-US" sz="2000" smtClean="0"/>
+              <a:rPr lang="en-US" sz="2000"/>
               <a:t>Xây dựng một chương trình giúp khách hàng chọn lựa thực đơn theo ý muốn của mình.</a:t>
             </a:r>
-            <a:endParaRPr lang="en-US" sz="2000"/>
           </a:p>
         </p:txBody>
       </p:sp>
@@ -6450,10 +6257,9 @@
           <a:lstStyle/>
           <a:p>
             <a:r>
-              <a:rPr lang="en-US" i="1" smtClean="0"/>
+              <a:rPr lang="en-US" i="1"/>
               <a:t>Sơ đồ lớp</a:t>
             </a:r>
-            <a:endParaRPr lang="en-US" i="1"/>
           </a:p>
         </p:txBody>
       </p:sp>
@@ -6542,13 +6348,8 @@
           <a:p>
             <a:r>
               <a:rPr lang="en-US" i="1"/>
-              <a:t>Code </a:t>
-            </a:r>
-            <a:r>
-              <a:rPr lang="en-US" i="1" smtClean="0"/>
-              <a:t>mẫu</a:t>
-            </a:r>
-            <a:endParaRPr lang="en-US" i="1"/>
+              <a:t>Code mẫu</a:t>
+            </a:r>
           </a:p>
         </p:txBody>
       </p:sp>
@@ -6804,7 +6605,7 @@
               <a:buChar char="•"/>
             </a:pPr>
             <a:r>
-              <a:rPr lang="en-US" sz="2000" smtClean="0"/>
+              <a:rPr lang="en-US" sz="2000"/>
               <a:t>IFood: Định nghĩa một giao diện chung cho các loại thức ăn và các Decorator sẽ hiện thực</a:t>
             </a:r>
           </a:p>
@@ -6814,7 +6615,7 @@
               <a:buChar char="•"/>
             </a:pPr>
             <a:r>
-              <a:rPr lang="en-US" sz="2000" smtClean="0"/>
+              <a:rPr lang="en-US" sz="2000"/>
               <a:t>FoodDecorator: lớp ảo cha của các Decorator, các Decorator (thêm coca, them đồ cay, …) sẽ là lớp con của lớp này.</a:t>
             </a:r>
           </a:p>
@@ -6824,7 +6625,7 @@
               <a:buChar char="•"/>
             </a:pPr>
             <a:r>
-              <a:rPr lang="en-US" sz="2000" smtClean="0"/>
+              <a:rPr lang="en-US" sz="2000"/>
               <a:t>Các lớp Decorator giữ một tham chiếu đến một đối tượng có kiểu IFood và khi được khởi tạo sẽ truyền vào các đối tượng có kiểu được kế thừa từ Ifood tương ứng (thông qua các hàm khởi tạo).</a:t>
             </a:r>
           </a:p>
@@ -6924,13 +6725,8 @@
             </a:pPr>
             <a:r>
               <a:rPr lang="en-US" sz="2000"/>
-              <a:t>Các control trong Windows </a:t>
-            </a:r>
-            <a:r>
-              <a:rPr lang="en-US" sz="2000" smtClean="0"/>
-              <a:t>Form.</a:t>
-            </a:r>
-            <a:endParaRPr lang="en-US" sz="2000"/>
+              <a:t>Các control trong Windows Form.</a:t>
+            </a:r>
           </a:p>
           <a:p>
             <a:pPr lvl="1">
@@ -6939,13 +6735,8 @@
             </a:pPr>
             <a:r>
               <a:rPr lang="en-US" sz="2000"/>
-              <a:t>Các lớp Stream trong .NET (Buffered Reader là một decorator của Stream class</a:t>
-            </a:r>
-            <a:r>
-              <a:rPr lang="en-US" sz="2000" smtClean="0"/>
-              <a:t>).</a:t>
-            </a:r>
-            <a:endParaRPr lang="en-US" sz="2000"/>
+              <a:t>Các lớp Stream trong .NET (Buffered Reader là một decorator của Stream class).</a:t>
+            </a:r>
           </a:p>
           <a:p>
             <a:pPr lvl="1">
@@ -6954,27 +6745,14 @@
             </a:pPr>
             <a:r>
               <a:rPr lang="en-US" sz="2000"/>
-              <a:t>Extension method trong .NET, (cho các class bị sealed vẫn có thể </a:t>
-            </a:r>
-            <a:r>
-              <a:rPr lang="en-US" sz="2000" smtClean="0"/>
-              <a:t>thêm </a:t>
-            </a:r>
-            <a:r>
-              <a:rPr lang="en-US" sz="2000"/>
-              <a:t>vào các phương </a:t>
-            </a:r>
-            <a:r>
-              <a:rPr lang="en-US" sz="2000" smtClean="0"/>
-              <a:t>thức).</a:t>
-            </a:r>
-            <a:endParaRPr lang="en-US" sz="2000"/>
+              <a:t>Extension method trong .NET, (cho các class bị sealed vẫn có thể thêm vào các phương thức).</a:t>
+            </a:r>
           </a:p>
           <a:p>
             <a:pPr marL="0" indent="0">
               <a:buNone/>
             </a:pPr>
-            <a:endParaRPr lang="en-US" sz="2000" smtClean="0"/>
+            <a:endParaRPr lang="en-US" sz="2000"/>
           </a:p>
         </p:txBody>
       </p:sp>
@@ -7000,13 +6778,6 @@
       </p:transition>
     </mc:Fallback>
   </mc:AlternateContent>
-  <p:timing>
-    <p:tnLst>
-      <p:par>
-        <p:cTn id="1" dur="indefinite" restart="never" nodeType="tmRoot"/>
-      </p:par>
-    </p:tnLst>
-  </p:timing>
 </p:sld>
 </file>
 
@@ -7076,17 +6847,8 @@
               <a:rPr lang="en-US" sz="2000">
                 <a:latin typeface="Constantia" panose="02030602050306030303" pitchFamily="18" charset="0"/>
               </a:rPr>
-              <a:t>Giới thiệu về </a:t>
-            </a:r>
-            <a:r>
-              <a:rPr lang="en-US" sz="2000" smtClean="0">
-                <a:latin typeface="Constantia" panose="02030602050306030303" pitchFamily="18" charset="0"/>
-              </a:rPr>
-              <a:t>Mẫu Thiết Kế</a:t>
-            </a:r>
-            <a:endParaRPr lang="en-US" sz="2000">
-              <a:latin typeface="Constantia" panose="02030602050306030303" pitchFamily="18" charset="0"/>
-            </a:endParaRPr>
+              <a:t>Giới thiệu về Mẫu Thiết Kế</a:t>
+            </a:r>
           </a:p>
           <a:p>
             <a:pPr lvl="1"/>
@@ -7094,13 +6856,7 @@
               <a:rPr lang="en-US" sz="2000">
                 <a:latin typeface="Constantia" panose="02030602050306030303" pitchFamily="18" charset="0"/>
               </a:rPr>
-              <a:t>Giới thiệu về các </a:t>
-            </a:r>
-            <a:r>
-              <a:rPr lang="en-US" sz="2000" smtClean="0">
-                <a:latin typeface="Constantia" panose="02030602050306030303" pitchFamily="18" charset="0"/>
-              </a:rPr>
-              <a:t>Mẫu Kiến Trúc</a:t>
+              <a:t>Giới thiệu về các Mẫu Kiến Trúc</a:t>
             </a:r>
             <a:endParaRPr lang="en-US" sz="2000" dirty="0">
               <a:latin typeface="Constantia" panose="02030602050306030303" pitchFamily="18" charset="0"/>
@@ -7115,7 +6871,7 @@
               <a:t>Mẫu </a:t>
             </a:r>
             <a:r>
-              <a:rPr lang="en-US" sz="2000" b="1" smtClean="0">
+              <a:rPr lang="en-US" sz="2000" b="1">
                 <a:latin typeface="Constantia" panose="02030602050306030303" pitchFamily="18" charset="0"/>
               </a:rPr>
               <a:t>Người trang trí - Decorator</a:t>
@@ -7133,19 +6889,19 @@
               <a:t>Mẫu </a:t>
             </a:r>
             <a:r>
-              <a:rPr lang="en-US" sz="2000" b="1" smtClean="0">
+              <a:rPr lang="en-US" sz="2000" b="1">
                 <a:latin typeface="Constantia" panose="02030602050306030303" pitchFamily="18" charset="0"/>
               </a:rPr>
               <a:t>Người đại diện </a:t>
             </a:r>
             <a:r>
-              <a:rPr lang="en-US" sz="2000" smtClean="0">
+              <a:rPr lang="en-US" sz="2000">
                 <a:latin typeface="Constantia" panose="02030602050306030303" pitchFamily="18" charset="0"/>
               </a:rPr>
               <a:t>– </a:t>
             </a:r>
             <a:r>
-              <a:rPr lang="en-US" sz="2000" b="1" smtClean="0">
+              <a:rPr lang="en-US" sz="2000" b="1">
                 <a:latin typeface="Constantia" panose="02030602050306030303" pitchFamily="18" charset="0"/>
               </a:rPr>
               <a:t>Proxy</a:t>
@@ -7154,7 +6910,7 @@
           <a:p>
             <a:pPr lvl="1"/>
             <a:r>
-              <a:rPr lang="en-US" sz="2000" smtClean="0">
+              <a:rPr lang="en-US" sz="2000">
                 <a:latin typeface="Constantia" panose="02030602050306030303" pitchFamily="18" charset="0"/>
               </a:rPr>
               <a:t>Tài liệu tham khảo</a:t>
@@ -7163,14 +6919,11 @@
           <a:p>
             <a:pPr lvl="1"/>
             <a:r>
-              <a:rPr lang="en-US" sz="2000" smtClean="0">
+              <a:rPr lang="en-US" sz="2000">
                 <a:latin typeface="Constantia" panose="02030602050306030303" pitchFamily="18" charset="0"/>
               </a:rPr>
               <a:t>Câu hỏi</a:t>
             </a:r>
-            <a:endParaRPr lang="en-US" sz="2000">
-              <a:latin typeface="Constantia" panose="02030602050306030303" pitchFamily="18" charset="0"/>
-            </a:endParaRPr>
           </a:p>
         </p:txBody>
       </p:sp>
@@ -7196,13 +6949,6 @@
       </p:transition>
     </mc:Fallback>
   </mc:AlternateContent>
-  <p:timing>
-    <p:tnLst>
-      <p:par>
-        <p:cTn id="1" dur="indefinite" restart="never" nodeType="tmRoot"/>
-      </p:par>
-    </p:tnLst>
-  </p:timing>
 </p:sld>
 </file>
 
@@ -7282,28 +7028,20 @@
               <a:t>Tuy nhiên, một Decorator có khả năng bổ sung các trách nhiệm cho thành phần </a:t>
             </a:r>
             <a:r>
-              <a:rPr lang="en-US" sz="2000" smtClean="0"/>
+              <a:rPr lang="en-US" sz="2000"/>
               <a:t>mà nó giữ tham chiếu</a:t>
             </a:r>
             <a:r>
-              <a:rPr lang="vi-VN" sz="2000" smtClean="0"/>
-              <a:t> </a:t>
-            </a:r>
-            <a:r>
               <a:rPr lang="vi-VN" sz="2000"/>
-              <a:t>- nó không dành cho việc quản lý </a:t>
-            </a:r>
-            <a:r>
-              <a:rPr lang="en-US" sz="2000" smtClean="0"/>
+              <a:t> - nó không dành cho việc quản lý </a:t>
+            </a:r>
+            <a:r>
+              <a:rPr lang="en-US" sz="2000"/>
               <a:t>một </a:t>
             </a:r>
             <a:r>
-              <a:rPr lang="vi-VN" sz="2000" smtClean="0"/>
-              <a:t>tập </a:t>
-            </a:r>
-            <a:r>
               <a:rPr lang="vi-VN" sz="2000"/>
-              <a:t>hợp các đối tượng.</a:t>
+              <a:t>tập hợp các đối tượng.</a:t>
             </a:r>
             <a:endParaRPr lang="en-US" sz="2000"/>
           </a:p>
@@ -7344,13 +7082,6 @@
       </p:transition>
     </mc:Fallback>
   </mc:AlternateContent>
-  <p:timing>
-    <p:tnLst>
-      <p:par>
-        <p:cTn id="1" dur="indefinite" restart="never" nodeType="tmRoot"/>
-      </p:par>
-    </p:tnLst>
-  </p:timing>
 </p:sld>
 </file>
 
@@ -7529,13 +7260,6 @@
       </p:transition>
     </mc:Fallback>
   </mc:AlternateContent>
-  <p:timing>
-    <p:tnLst>
-      <p:par>
-        <p:cTn id="1" dur="indefinite" restart="never" nodeType="tmRoot"/>
-      </p:par>
-    </p:tnLst>
-  </p:timing>
 </p:sld>
 </file>
 
@@ -7598,16 +7322,12 @@
           <a:p>
             <a:pPr lvl="1"/>
             <a:r>
-              <a:rPr lang="en-US" sz="2000" i="1" smtClean="0"/>
+              <a:rPr lang="en-US" sz="2000" i="1"/>
               <a:t>“Cung cấp một sự thay thế hay giữ cho một đối tượng thực sự để kiểm soát các truy cập đến nó</a:t>
             </a:r>
             <a:r>
-              <a:rPr lang="en-US" sz="2000" smtClean="0"/>
-              <a:t>.” </a:t>
-            </a:r>
-            <a:r>
               <a:rPr lang="en-US" sz="2000"/>
-              <a:t>(GoF)</a:t>
+              <a:t>.” (GoF)</a:t>
             </a:r>
           </a:p>
           <a:p>
@@ -7637,13 +7357,6 @@
       </p:transition>
     </mc:Fallback>
   </mc:AlternateContent>
-  <p:timing>
-    <p:tnLst>
-      <p:par>
-        <p:cTn id="1" dur="indefinite" restart="never" nodeType="tmRoot"/>
-      </p:par>
-    </p:tnLst>
-  </p:timing>
 </p:sld>
 </file>
 
@@ -7709,7 +7422,7 @@
               <a:buChar char="o"/>
             </a:pPr>
             <a:r>
-              <a:rPr lang="en-US" smtClean="0"/>
+              <a:rPr lang="en-US"/>
               <a:t>Khi ta cần khả năng kiểm soát các truy xuất đến đôi tượng do nhiều lý do khác nhau:</a:t>
             </a:r>
           </a:p>
@@ -7719,7 +7432,7 @@
               <a:buChar char="o"/>
             </a:pPr>
             <a:r>
-              <a:rPr lang="en-US" smtClean="0"/>
+              <a:rPr lang="en-US"/>
               <a:t>Khi đối tượng đó tốn nhiều tài nguyên để được khởi tạo và quá trình khởi tạo chúng mất nhiều thời gian.</a:t>
             </a:r>
           </a:p>
@@ -7729,7 +7442,7 @@
               <a:buChar char="o"/>
             </a:pPr>
             <a:r>
-              <a:rPr lang="en-US" smtClean="0"/>
+              <a:rPr lang="en-US"/>
               <a:t>Cung cấp các quyền truy cập vào đối tượng.</a:t>
             </a:r>
           </a:p>
@@ -7739,7 +7452,7 @@
               <a:buChar char="o"/>
             </a:pPr>
             <a:r>
-              <a:rPr lang="en-US" smtClean="0"/>
+              <a:rPr lang="en-US"/>
               <a:t>Cung cấp một cách truy cập sophisticated đối tượng đang chạy trên một tiến trình khác hay trên một máy tính khác</a:t>
             </a:r>
           </a:p>
@@ -7774,13 +7487,6 @@
       </p:transition>
     </mc:Fallback>
   </mc:AlternateContent>
-  <p:timing>
-    <p:tnLst>
-      <p:par>
-        <p:cTn id="1" dur="indefinite" restart="never" nodeType="tmRoot"/>
-      </p:par>
-    </p:tnLst>
-  </p:timing>
 </p:sld>
 </file>
 
@@ -7847,14 +7553,14 @@
           <a:p>
             <a:pPr lvl="1"/>
             <a:r>
-              <a:rPr lang="en-US" sz="2000" smtClean="0"/>
+              <a:rPr lang="en-US" sz="2000"/>
               <a:t>Các tình huống thường thấy khi cần áp dụng một mẫu proxy:</a:t>
             </a:r>
           </a:p>
           <a:p>
             <a:pPr lvl="2"/>
             <a:r>
-              <a:rPr lang="en-US" sz="2000" smtClean="0">
+              <a:rPr lang="en-US" sz="2000">
                 <a:solidFill>
                   <a:schemeClr val="accent1"/>
                 </a:solidFill>
@@ -7862,19 +7568,19 @@
               <a:t>Proxy ảo</a:t>
             </a:r>
             <a:r>
-              <a:rPr lang="en-US" sz="2000" smtClean="0"/>
+              <a:rPr lang="en-US" sz="2000"/>
               <a:t>: làm trì hoãn quá trình khởi tạo của một đối tượng tốn kém cho đến khi thực sự cần.. </a:t>
             </a:r>
             <a:r>
               <a:rPr lang="vi-VN" sz="2000"/>
               <a:t>Virtual Proxy tạo ra một đối tượng trung gian mỗi khi có yêu cầu tại thời điểm thực thi ứng dụng, nhờ đó làm tăng hiệu suất của ứng dụng. </a:t>
             </a:r>
-            <a:endParaRPr lang="en-US" sz="2000" smtClean="0"/>
+            <a:endParaRPr lang="en-US" sz="2000"/>
           </a:p>
           <a:p>
             <a:pPr lvl="2"/>
             <a:r>
-              <a:rPr lang="en-US" sz="2000" smtClean="0">
+              <a:rPr lang="en-US" sz="2000">
                 <a:solidFill>
                   <a:schemeClr val="accent1"/>
                 </a:solidFill>
@@ -7882,14 +7588,14 @@
               <a:t>Proxy từ xa</a:t>
             </a:r>
             <a:r>
-              <a:rPr lang="en-US" sz="2000" smtClean="0"/>
+              <a:rPr lang="en-US" sz="2000"/>
               <a:t>: cung cấp một thể hiện cục bộ của một đối tượng trong một khoảng không gian địa chỉ khác. Một ví dụ là đối tượng stub của Java RMI. Đối tượng stub của RMI hoạt động như một proxy khi chúng ta invoke các phương thức của nó thì nó sẽ liên lạc với các đối tượng từ xa trên các máy tính khác (remote object) và invoke các phương thức của chúng.</a:t>
             </a:r>
           </a:p>
           <a:p>
             <a:pPr lvl="2"/>
             <a:r>
-              <a:rPr lang="en-US" sz="2000" smtClean="0">
+              <a:rPr lang="en-US" sz="2000">
                 <a:solidFill>
                   <a:schemeClr val="accent1"/>
                 </a:solidFill>
@@ -7897,7 +7603,7 @@
               <a:t>Proxy bảo vệ</a:t>
             </a:r>
             <a:r>
-              <a:rPr lang="en-US" sz="2000" smtClean="0"/>
+              <a:rPr lang="en-US" sz="2000"/>
               <a:t>: khi một proxy điều khiển truy cập đối một đối tượng RealObject nào đó, cho phép chúng từ đối không  bị truy xuất bởi các đối tượng khác.</a:t>
             </a:r>
           </a:p>
@@ -7913,23 +7619,7 @@
             </a:r>
             <a:r>
               <a:rPr lang="en-US" sz="2000"/>
-              <a:t>h: cung cấp một </a:t>
-            </a:r>
-            <a:r>
-              <a:rPr lang="en-US" sz="2000" smtClean="0"/>
-              <a:t>cách </a:t>
-            </a:r>
-            <a:r>
-              <a:rPr lang="en-US" sz="2000"/>
-              <a:t>truy cập </a:t>
-            </a:r>
-            <a:r>
-              <a:rPr lang="en-US" sz="2000" smtClean="0"/>
-              <a:t>sophisticated đến một số đối tượng nào đó và theo dõi số lượng các tham chiếu đên đối tượng và ngăn cản các truy cập tiếp theo nếu con số này đạt mức giới hạn, cũng như nạp một đối tượng từ CSDL vào bộ nhớ một cách demand</a:t>
-            </a:r>
-            <a:r>
-              <a:rPr lang="en-US" sz="2000"/>
-              <a:t/>
+              <a:t>h: cung cấp một cách truy cập sophisticated đến một số đối tượng nào đó và theo dõi số lượng các tham chiếu đên đối tượng và ngăn cản các truy cập tiếp theo nếu con số này đạt mức giới hạn, cũng như nạp một đối tượng từ CSDL vào bộ nhớ một cách demand</a:t>
             </a:r>
             <a:br>
               <a:rPr lang="en-US" sz="2000"/>
@@ -7963,13 +7653,6 @@
       </p:transition>
     </mc:Fallback>
   </mc:AlternateContent>
-  <p:timing>
-    <p:tnLst>
-      <p:par>
-        <p:cTn id="1" dur="indefinite" restart="never" nodeType="tmRoot"/>
-      </p:par>
-    </p:tnLst>
-  </p:timing>
 </p:sld>
 </file>
 
@@ -8059,13 +7742,6 @@
       </p:transition>
     </mc:Fallback>
   </mc:AlternateContent>
-  <p:timing>
-    <p:tnLst>
-      <p:par>
-        <p:cTn id="1" dur="indefinite" restart="never" nodeType="tmRoot"/>
-      </p:par>
-    </p:tnLst>
-  </p:timing>
 </p:sld>
 </file>
 
@@ -8144,70 +7820,67 @@
           <a:p>
             <a:pPr lvl="2"/>
             <a:r>
-              <a:rPr lang="en-US" sz="2200" smtClean="0"/>
+              <a:rPr lang="en-US" sz="2200"/>
               <a:t>Giữ một tham chiếu cho phép proxy truy cập đến đối tượng thực sự, ở đây là một đối tượng  có kiểu dữ liệu là RealSubject,</a:t>
             </a:r>
           </a:p>
           <a:p>
             <a:pPr lvl="2"/>
             <a:r>
-              <a:rPr lang="en-US" sz="2200" smtClean="0"/>
+              <a:rPr lang="en-US" sz="2200"/>
               <a:t>Hiện thực hóa từ giao diện Subject khi đó Proxy và RealSubject có vai trò như nhau và có thể thay thế nhau.</a:t>
             </a:r>
           </a:p>
           <a:p>
             <a:pPr lvl="2"/>
             <a:r>
-              <a:rPr lang="en-US" sz="2200" smtClean="0"/>
+              <a:rPr lang="en-US" sz="2200"/>
               <a:t>Giữ quyền điều khiển và quyền truy cập vào đối tượng RealSubject, có thể khởi tạo hay xóa đối tượng RealSubject theo nhu cầu.</a:t>
             </a:r>
-            <a:endParaRPr lang="en-US" sz="2200"/>
           </a:p>
           <a:p>
             <a:pPr lvl="2"/>
             <a:r>
-              <a:rPr lang="en-US" sz="2200" smtClean="0"/>
+              <a:rPr lang="en-US" sz="2200"/>
               <a:t>Các trách nhiệm khác tùy thuộc vào kiểu proxy được sử dụng:</a:t>
             </a:r>
           </a:p>
           <a:p>
             <a:pPr lvl="2"/>
             <a:r>
-              <a:rPr lang="en-US" sz="2200" i="1" smtClean="0"/>
+              <a:rPr lang="en-US" sz="2200" i="1"/>
               <a:t>Proxy từ xa: </a:t>
             </a:r>
             <a:r>
-              <a:rPr lang="en-US" sz="2200" smtClean="0"/>
+              <a:rPr lang="en-US" sz="2200"/>
               <a:t>Chịu trách nhiệm mã hóa một yêu cầu kèm theo các tham số và gởi chúng đến đối tượng thực hiện đang ở trong một miền không gian địa chỉ khác</a:t>
             </a:r>
             <a:r>
-              <a:rPr lang="en-US" sz="2200" i="1" smtClean="0"/>
+              <a:rPr lang="en-US" sz="2200" i="1"/>
               <a:t>.</a:t>
             </a:r>
           </a:p>
           <a:p>
             <a:pPr lvl="2"/>
             <a:r>
-              <a:rPr lang="en-US" sz="2200" i="1" smtClean="0"/>
+              <a:rPr lang="en-US" sz="2200" i="1"/>
               <a:t>Proxy ảo: </a:t>
             </a:r>
             <a:r>
-              <a:rPr lang="en-US" sz="2200" smtClean="0"/>
+              <a:rPr lang="en-US" sz="2200"/>
               <a:t>Lưu các thông tin về đối tượng thực trong cache để phản hồi lại các truy cập vào chúng.</a:t>
             </a:r>
-            <a:endParaRPr lang="en-US" sz="2200"/>
           </a:p>
           <a:p>
             <a:pPr lvl="2"/>
             <a:r>
-              <a:rPr lang="en-US" sz="2200" i="1" smtClean="0"/>
+              <a:rPr lang="en-US" sz="2200" i="1"/>
               <a:t>Proxy bảo vệ: </a:t>
             </a:r>
             <a:r>
-              <a:rPr lang="en-US" sz="2200" smtClean="0"/>
+              <a:rPr lang="en-US" sz="2200"/>
               <a:t>Kiểm tra nơi gọi có quyền truy xuất để thực hiện request đến đối tượng nó bảo vệ hay không.</a:t>
             </a:r>
-            <a:endParaRPr lang="en-US" sz="2200"/>
           </a:p>
           <a:p>
             <a:pPr lvl="1"/>
@@ -8215,27 +7888,26 @@
               <a:rPr lang="en-US" sz="2200" b="1"/>
               <a:t>Subject </a:t>
             </a:r>
-            <a:endParaRPr lang="en-US" sz="2200" b="1" smtClean="0"/>
           </a:p>
           <a:p>
             <a:pPr lvl="2"/>
             <a:r>
-              <a:rPr lang="en-US" sz="2200" smtClean="0"/>
+              <a:rPr lang="en-US" sz="2200"/>
               <a:t>Định nghĩa một giao diện chung cho cả RealSubject và Proxy, do đó một Proxy có thể được sử dụng ở bất kỳ đâu yêu cầu một đối tượng kiểu RealSubject.</a:t>
             </a:r>
           </a:p>
           <a:p>
             <a:pPr lvl="1"/>
             <a:r>
-              <a:rPr lang="en-US" sz="2200" b="1" smtClean="0"/>
+              <a:rPr lang="en-US" sz="2200" b="1"/>
               <a:t>RealSubject </a:t>
             </a:r>
-            <a:endParaRPr lang="en-US" sz="2200" smtClean="0"/>
+            <a:endParaRPr lang="en-US" sz="2200"/>
           </a:p>
           <a:p>
             <a:pPr lvl="2"/>
             <a:r>
-              <a:rPr lang="en-US" sz="2200" smtClean="0"/>
+              <a:rPr lang="en-US" sz="2200"/>
               <a:t>Định nghĩa đối tượng thực sự mà proxy đang thể hiện.</a:t>
             </a:r>
             <a:endParaRPr lang="en-US"/>
@@ -8264,13 +7936,6 @@
       </p:transition>
     </mc:Fallback>
   </mc:AlternateContent>
-  <p:timing>
-    <p:tnLst>
-      <p:par>
-        <p:cTn id="1" dur="indefinite" restart="never" nodeType="tmRoot"/>
-      </p:par>
-    </p:tnLst>
-  </p:timing>
 </p:sld>
 </file>
 
@@ -8361,13 +8026,6 @@
       </p:transition>
     </mc:Fallback>
   </mc:AlternateContent>
-  <p:timing>
-    <p:tnLst>
-      <p:par>
-        <p:cTn id="1" dur="indefinite" restart="never" nodeType="tmRoot"/>
-      </p:par>
-    </p:tnLst>
-  </p:timing>
 </p:sld>
 </file>
 
@@ -8431,11 +8089,11 @@
               <a:buChar char="•"/>
             </a:pPr>
             <a:r>
-              <a:rPr lang="en-US" smtClean="0"/>
+              <a:rPr lang="en-US"/>
               <a:t>Che giấu thông tin của các đối tượng thực sự đối với các client sử dụng chúng bằng cách </a:t>
             </a:r>
             <a:r>
-              <a:rPr lang="en-US" smtClean="0">
+              <a:rPr lang="en-US">
                 <a:solidFill>
                   <a:schemeClr val="tx1"/>
                 </a:solidFill>
@@ -8443,31 +8101,15 @@
               <a:t>c</a:t>
             </a:r>
             <a:r>
-              <a:rPr lang="vi-VN" smtClean="0">
-                <a:solidFill>
-                  <a:schemeClr val="tx1"/>
-                </a:solidFill>
-              </a:rPr>
-              <a:t>ung </a:t>
-            </a:r>
-            <a:r>
               <a:rPr lang="vi-VN">
                 <a:solidFill>
                   <a:schemeClr val="tx1"/>
                 </a:solidFill>
               </a:rPr>
-              <a:t>cấp mức truy cập gián tiếp vào </a:t>
-            </a:r>
-            <a:r>
-              <a:rPr lang="vi-VN" smtClean="0">
-                <a:solidFill>
-                  <a:schemeClr val="tx1"/>
-                </a:solidFill>
-              </a:rPr>
-              <a:t>đối tượng</a:t>
-            </a:r>
-            <a:r>
-              <a:rPr lang="en-US" smtClean="0">
+              <a:t>ung cấp mức truy cập gián tiếp vào đối tượng</a:t>
+            </a:r>
+            <a:r>
+              <a:rPr lang="en-US">
                 <a:solidFill>
                   <a:schemeClr val="tx1"/>
                 </a:solidFill>
@@ -8475,7 +8117,7 @@
               <a:t> đó và cơ chế </a:t>
             </a:r>
             <a:r>
-              <a:rPr lang="en-US" b="1" smtClean="0">
+              <a:rPr lang="en-US" b="1">
                 <a:solidFill>
                   <a:schemeClr val="tx1"/>
                 </a:solidFill>
@@ -8483,7 +8125,7 @@
               <a:t> </a:t>
             </a:r>
             <a:r>
-              <a:rPr lang="en-US" smtClean="0">
+              <a:rPr lang="en-US">
                 <a:solidFill>
                   <a:schemeClr val="tx1"/>
                 </a:solidFill>
@@ -8491,30 +8133,14 @@
               <a:t>th</a:t>
             </a:r>
             <a:r>
-              <a:rPr lang="vi-VN" smtClean="0">
-                <a:solidFill>
-                  <a:schemeClr val="tx1"/>
-                </a:solidFill>
-              </a:rPr>
-              <a:t>am </a:t>
-            </a:r>
-            <a:r>
               <a:rPr lang="vi-VN">
                 <a:solidFill>
                   <a:schemeClr val="tx1"/>
                 </a:solidFill>
               </a:rPr>
-              <a:t>chiếu vào đối tượng đích và chuyển tiếp các yêu cầu đến đối tượng đó</a:t>
-            </a:r>
-            <a:r>
-              <a:rPr lang="vi-VN" smtClean="0">
-                <a:solidFill>
-                  <a:schemeClr val="tx1"/>
-                </a:solidFill>
-              </a:rPr>
-              <a:t>.</a:t>
-            </a:r>
-            <a:endParaRPr lang="en-US" smtClean="0"/>
+              <a:t>am chiếu vào đối tượng đích và chuyển tiếp các yêu cầu đến đối tượng đó.</a:t>
+            </a:r>
+            <a:endParaRPr lang="en-US"/>
           </a:p>
           <a:p>
             <a:pPr lvl="1">
@@ -8522,7 +8148,7 @@
               <a:buChar char="•"/>
             </a:pPr>
             <a:r>
-              <a:rPr lang="en-US" smtClean="0"/>
+              <a:rPr lang="en-US"/>
               <a:t>Tối ưu hóa hoạt động của hệ thống nhờ cơ chế tải theo nhu cầu – demand loading.</a:t>
             </a:r>
           </a:p>
@@ -8531,21 +8157,13 @@
               <a:buFont typeface="Arial" panose="020B0604020202020204" pitchFamily="34" charset="0"/>
               <a:buChar char="•"/>
             </a:pPr>
-            <a:r>
-              <a:rPr lang="vi-VN" smtClean="0">
-                <a:solidFill>
-                  <a:schemeClr val="tx1"/>
-                </a:solidFill>
-              </a:rPr>
-              <a:t>Cả </a:t>
-            </a:r>
             <a:r>
               <a:rPr lang="vi-VN">
                 <a:solidFill>
                   <a:schemeClr val="tx1"/>
                 </a:solidFill>
               </a:rPr>
-              <a:t>proxy và đối tượng đích đều kế thừa hoặc thực thi chung một lớp giao diện. Mã máy dịch cho lớp giao diện thường “nhẹ” hơn các lớp cụ thể và do đó có thể giảm được thời gian tải dữ liệu giữa server và client.</a:t>
+              <a:t>Cả proxy và đối tượng đích đều kế thừa hoặc thực thi chung một lớp giao diện. Mã máy dịch cho lớp giao diện thường “nhẹ” hơn các lớp cụ thể và do đó có thể giảm được thời gian tải dữ liệu giữa server và client.</a:t>
             </a:r>
             <a:endParaRPr lang="en-US"/>
           </a:p>
@@ -8554,7 +8172,7 @@
               <a:buFont typeface="Arial" panose="020B0604020202020204" pitchFamily="34" charset="0"/>
               <a:buChar char="•"/>
             </a:pPr>
-            <a:endParaRPr lang="en-US" smtClean="0"/>
+            <a:endParaRPr lang="en-US"/>
           </a:p>
           <a:p>
             <a:pPr lvl="1">
@@ -8645,10 +8263,9 @@
           <a:lstStyle/>
           <a:p>
             <a:r>
-              <a:rPr lang="en-US" smtClean="0"/>
+              <a:rPr lang="en-US"/>
               <a:t>- </a:t>
             </a:r>
-            <a:endParaRPr lang="en-US"/>
           </a:p>
         </p:txBody>
       </p:sp>
@@ -8711,11 +8328,7 @@
           <a:p>
             <a:r>
               <a:rPr lang="en-US"/>
-              <a:t>Giới thiệu về Mẫu Thiết </a:t>
-            </a:r>
-            <a:r>
-              <a:rPr lang="en-US" smtClean="0"/>
-              <a:t>Kế</a:t>
+              <a:t>Giới thiệu về Mẫu Thiết Kế</a:t>
             </a:r>
             <a:endParaRPr lang="en-US" dirty="0"/>
           </a:p>
@@ -8800,13 +8413,6 @@
       </p:transition>
     </mc:Fallback>
   </mc:AlternateContent>
-  <p:timing>
-    <p:tnLst>
-      <p:par>
-        <p:cTn id="1" dur="indefinite" restart="never" nodeType="tmRoot"/>
-      </p:par>
-    </p:tnLst>
-  </p:timing>
 </p:sld>
 </file>
 
@@ -8868,17 +8474,16 @@
           <a:p>
             <a:pPr lvl="1"/>
             <a:r>
-              <a:rPr lang="en-US" sz="2000" smtClean="0"/>
+              <a:rPr lang="en-US" sz="2000"/>
               <a:t>Bài toán:</a:t>
             </a:r>
           </a:p>
           <a:p>
             <a:pPr lvl="1"/>
             <a:r>
-              <a:rPr lang="en-US" sz="2000" smtClean="0"/>
+              <a:rPr lang="en-US" sz="2000"/>
               <a:t>Yêu cầu:</a:t>
             </a:r>
-            <a:endParaRPr lang="en-US" sz="2000"/>
           </a:p>
         </p:txBody>
       </p:sp>
@@ -8940,10 +8545,9 @@
           <a:lstStyle/>
           <a:p>
             <a:r>
-              <a:rPr lang="en-US" i="1" smtClean="0"/>
+              <a:rPr lang="en-US" i="1"/>
               <a:t>Sơ đồ lớp</a:t>
             </a:r>
-            <a:endParaRPr lang="en-US" i="1"/>
           </a:p>
         </p:txBody>
       </p:sp>
@@ -9025,13 +8629,8 @@
           <a:p>
             <a:r>
               <a:rPr lang="en-US" i="1"/>
-              <a:t>Code </a:t>
-            </a:r>
-            <a:r>
-              <a:rPr lang="en-US" i="1" smtClean="0"/>
-              <a:t>mẫu</a:t>
-            </a:r>
-            <a:endParaRPr lang="en-US" i="1"/>
+              <a:t>Code mẫu</a:t>
+            </a:r>
           </a:p>
         </p:txBody>
       </p:sp>
@@ -9203,7 +8802,7 @@
               <a:buChar char="•"/>
             </a:pPr>
             <a:r>
-              <a:rPr lang="en-US" smtClean="0"/>
+              <a:rPr lang="en-US"/>
               <a:t>Các hệ thống cần truy cập thông tin từ các hệ thống khác đa phần sử dụng kiến trúc Proxy</a:t>
             </a:r>
           </a:p>
@@ -9213,7 +8812,7 @@
               <a:buChar char="•"/>
             </a:pPr>
             <a:r>
-              <a:rPr lang="en-US" smtClean="0"/>
+              <a:rPr lang="en-US"/>
               <a:t>Các máy khách sử dụng các dịch vụ WCF phụ thuộc vào các đối tượng proxy được WCF tự động tạo ra.</a:t>
             </a:r>
           </a:p>
@@ -9223,12 +8822,8 @@
               <a:buChar char="•"/>
             </a:pPr>
             <a:r>
-              <a:rPr lang="en-US" smtClean="0"/>
+              <a:rPr lang="en-US"/>
               <a:t>Máy ATM có một proxy ảo lưu các thông tin ngân hàng được dùng khi xác nhận thẻ tín dụng,…</a:t>
-            </a:r>
-            <a:r>
-              <a:rPr lang="en-US"/>
-              <a:t/>
             </a:r>
             <a:br>
               <a:rPr lang="en-US"/>
@@ -9429,11 +9024,7 @@
           <a:p>
             <a:r>
               <a:rPr lang="en-US"/>
-              <a:t>Giới thiệu về các Mẫu Kiến </a:t>
-            </a:r>
-            <a:r>
-              <a:rPr lang="en-US" smtClean="0"/>
-              <a:t>Trúc</a:t>
+              <a:t>Giới thiệu về các Mẫu Kiến Trúc</a:t>
             </a:r>
             <a:endParaRPr lang="en-US" dirty="0"/>
           </a:p>
@@ -9468,47 +9059,14 @@
               </a:rPr>
               <a:t>Định nghĩa: </a:t>
             </a:r>
-            <a:endParaRPr lang="en-US" sz="2000" smtClean="0">
-              <a:latin typeface="Constantia" panose="02030602050306030303" pitchFamily="18" charset="0"/>
-            </a:endParaRPr>
           </a:p>
           <a:p>
             <a:pPr lvl="2"/>
-            <a:r>
-              <a:rPr lang="en-US" sz="1800" smtClean="0">
-                <a:latin typeface="Constantia" panose="02030602050306030303" pitchFamily="18" charset="0"/>
-              </a:rPr>
-              <a:t>Trong </a:t>
-            </a:r>
             <a:r>
               <a:rPr lang="en-US" sz="1800">
                 <a:latin typeface="Constantia" panose="02030602050306030303" pitchFamily="18" charset="0"/>
               </a:rPr>
-              <a:t>lĩnh vực CNPM, các mẫu </a:t>
-            </a:r>
-            <a:r>
-              <a:rPr lang="en-US" sz="1800" smtClean="0">
-                <a:latin typeface="Constantia" panose="02030602050306030303" pitchFamily="18" charset="0"/>
-              </a:rPr>
-              <a:t>Kiến trúc </a:t>
-            </a:r>
-            <a:r>
-              <a:rPr lang="en-US" sz="1800">
-                <a:latin typeface="Constantia" panose="02030602050306030303" pitchFamily="18" charset="0"/>
-              </a:rPr>
-              <a:t>là các mẫu thiết kế giúp đơn giản hóa quá trình thiết kế bằng </a:t>
-            </a:r>
-            <a:r>
-              <a:rPr lang="en-US" sz="1800" smtClean="0">
-                <a:latin typeface="Constantia" panose="02030602050306030303" pitchFamily="18" charset="0"/>
-              </a:rPr>
-              <a:t>cách giúp chúng ta </a:t>
-            </a:r>
-            <a:r>
-              <a:rPr lang="en-US" sz="1800">
-                <a:latin typeface="Constantia" panose="02030602050306030303" pitchFamily="18" charset="0"/>
-              </a:rPr>
-              <a:t>xác định các mối quan hệ giữa các thực thể một cách dễ dàng hơn.</a:t>
+              <a:t>Trong lĩnh vực CNPM, các mẫu Kiến trúc là các mẫu thiết kế giúp đơn giản hóa quá trình thiết kế bằng cách giúp chúng ta xác định các mối quan hệ giữa các thực thể một cách dễ dàng hơn.</a:t>
             </a:r>
           </a:p>
           <a:p>
@@ -9532,29 +9090,8 @@
               <a:rPr lang="en-US" sz="1800">
                 <a:latin typeface="Constantia" panose="02030602050306030303" pitchFamily="18" charset="0"/>
               </a:rPr>
-              <a:t>C</a:t>
-            </a:r>
-            <a:r>
-              <a:rPr lang="en-US" sz="1800" smtClean="0">
-                <a:latin typeface="Constantia" panose="02030602050306030303" pitchFamily="18" charset="0"/>
-              </a:rPr>
-              <a:t>ung </a:t>
-            </a:r>
-            <a:r>
-              <a:rPr lang="en-US" sz="1800">
-                <a:latin typeface="Constantia" panose="02030602050306030303" pitchFamily="18" charset="0"/>
-              </a:rPr>
-              <a:t>cấp một giao diện mới phù hợp hơn cho một đối </a:t>
-            </a:r>
-            <a:r>
-              <a:rPr lang="en-US" sz="1800" smtClean="0">
-                <a:latin typeface="Constantia" panose="02030602050306030303" pitchFamily="18" charset="0"/>
-              </a:rPr>
-              <a:t>tượng.</a:t>
-            </a:r>
-            <a:endParaRPr lang="en-US" sz="1800">
-              <a:latin typeface="Constantia" panose="02030602050306030303" pitchFamily="18" charset="0"/>
-            </a:endParaRPr>
+              <a:t>Cung cấp một giao diện mới phù hợp hơn cho một đối tượng.</a:t>
+            </a:r>
           </a:p>
           <a:p>
             <a:pPr lvl="2"/>
@@ -9568,47 +9105,23 @@
               <a:rPr lang="en-US" sz="1800">
                 <a:latin typeface="Constantia" panose="02030602050306030303" pitchFamily="18" charset="0"/>
               </a:rPr>
-              <a:t>Tách rời phần trừu tượng và phàn hiện thức của một đối </a:t>
-            </a:r>
-            <a:r>
-              <a:rPr lang="en-US" sz="1800" smtClean="0">
-                <a:latin typeface="Constantia" panose="02030602050306030303" pitchFamily="18" charset="0"/>
-              </a:rPr>
-              <a:t>tượng.</a:t>
-            </a:r>
-            <a:endParaRPr lang="en-US" sz="1800">
-              <a:latin typeface="Constantia" panose="02030602050306030303" pitchFamily="18" charset="0"/>
-            </a:endParaRPr>
+              <a:t>Tách rời phần trừu tượng và phàn hiện thức của một đối tượng.</a:t>
+            </a:r>
           </a:p>
           <a:p>
             <a:pPr lvl="2"/>
-            <a:r>
-              <a:rPr lang="en-US" sz="1800" b="1" smtClean="0">
-                <a:latin typeface="Constantia" panose="02030602050306030303" pitchFamily="18" charset="0"/>
-              </a:rPr>
-              <a:t>Composite </a:t>
-            </a:r>
             <a:r>
               <a:rPr lang="en-US" sz="1800" b="1">
                 <a:latin typeface="Constantia" panose="02030602050306030303" pitchFamily="18" charset="0"/>
               </a:rPr>
-              <a:t>– </a:t>
+              <a:t>Composite – </a:t>
             </a:r>
             <a:r>
               <a:rPr lang="en-US" sz="1800">
                 <a:latin typeface="Constantia" panose="02030602050306030303" pitchFamily="18" charset="0"/>
               </a:rPr>
-              <a:t>Kết hợp nhiều đối tượng bên trong một đối tượng khác để quản </a:t>
-            </a:r>
-            <a:r>
-              <a:rPr lang="en-US" sz="1800" smtClean="0">
-                <a:latin typeface="Constantia" panose="02030602050306030303" pitchFamily="18" charset="0"/>
-              </a:rPr>
-              <a:t>lý.</a:t>
-            </a:r>
-            <a:endParaRPr lang="en-US" sz="1800">
-              <a:latin typeface="Constantia" panose="02030602050306030303" pitchFamily="18" charset="0"/>
-            </a:endParaRPr>
+              <a:t>Kết hợp nhiều đối tượng bên trong một đối tượng khác để quản lý.</a:t>
+            </a:r>
           </a:p>
           <a:p>
             <a:pPr lvl="2"/>
@@ -9622,17 +9135,8 @@
               <a:rPr lang="en-US" sz="1800">
                 <a:latin typeface="Constantia" panose="02030602050306030303" pitchFamily="18" charset="0"/>
               </a:rPr>
-              <a:t>Cung cấp them các trách nhiệm cho một đối tượng một cách linh </a:t>
-            </a:r>
-            <a:r>
-              <a:rPr lang="en-US" sz="1800" smtClean="0">
-                <a:latin typeface="Constantia" panose="02030602050306030303" pitchFamily="18" charset="0"/>
-              </a:rPr>
-              <a:t>hoạt.</a:t>
-            </a:r>
-            <a:endParaRPr lang="en-US" sz="1800">
-              <a:latin typeface="Constantia" panose="02030602050306030303" pitchFamily="18" charset="0"/>
-            </a:endParaRPr>
+              <a:t>Cung cấp them các trách nhiệm cho một đối tượng một cách linh hoạt.</a:t>
+            </a:r>
           </a:p>
           <a:p>
             <a:pPr lvl="2"/>
@@ -9646,29 +9150,8 @@
               <a:rPr lang="en-US" sz="1800">
                 <a:latin typeface="Constantia" panose="02030602050306030303" pitchFamily="18" charset="0"/>
               </a:rPr>
-              <a:t>Cung cấp một giao diện </a:t>
-            </a:r>
-            <a:r>
-              <a:rPr lang="en-US" sz="1800" smtClean="0">
-                <a:latin typeface="Constantia" panose="02030602050306030303" pitchFamily="18" charset="0"/>
-              </a:rPr>
-              <a:t>thống nhất dễ sử dụng </a:t>
-            </a:r>
-            <a:r>
-              <a:rPr lang="en-US" sz="1800">
-                <a:latin typeface="Constantia" panose="02030602050306030303" pitchFamily="18" charset="0"/>
-              </a:rPr>
-              <a:t>cho </a:t>
-            </a:r>
-            <a:r>
-              <a:rPr lang="en-US" sz="1800" smtClean="0">
-                <a:latin typeface="Constantia" panose="02030602050306030303" pitchFamily="18" charset="0"/>
-              </a:rPr>
-              <a:t>một tập hợp các giao diện trong một hệ thống con.</a:t>
-            </a:r>
-            <a:endParaRPr lang="en-US" sz="1800">
-              <a:latin typeface="Constantia" panose="02030602050306030303" pitchFamily="18" charset="0"/>
-            </a:endParaRPr>
+              <a:t>Cung cấp một giao diện thống nhất dễ sử dụng cho một tập hợp các giao diện trong một hệ thống con.</a:t>
+            </a:r>
           </a:p>
           <a:p>
             <a:pPr lvl="2"/>
@@ -9676,25 +9159,13 @@
               <a:rPr lang="en-US" sz="1800" b="1">
                 <a:latin typeface="Constantia" panose="02030602050306030303" pitchFamily="18" charset="0"/>
               </a:rPr>
-              <a:t>Flyweight - </a:t>
-            </a:r>
-            <a:r>
-              <a:rPr lang="en-US" sz="1800" b="1" smtClean="0">
-                <a:latin typeface="Constantia" panose="02030602050306030303" pitchFamily="18" charset="0"/>
-              </a:rPr>
-              <a:t>S</a:t>
-            </a:r>
-            <a:r>
-              <a:rPr lang="vi-VN" sz="1800" smtClean="0">
-                <a:latin typeface="Constantia" panose="02030602050306030303" pitchFamily="18" charset="0"/>
-              </a:rPr>
-              <a:t>ử </a:t>
+              <a:t>Flyweight - S</a:t>
             </a:r>
             <a:r>
               <a:rPr lang="vi-VN" sz="1800">
                 <a:latin typeface="Constantia" panose="02030602050306030303" pitchFamily="18" charset="0"/>
               </a:rPr>
-              <a:t>dụng tính năng chia sẻ để hỗ trợ xử lý số lượng lớn các đối tượng một cách hiệu quả.</a:t>
+              <a:t>ử dụng tính năng chia sẻ để hỗ trợ xử lý số lượng lớn các đối tượng một cách hiệu quả.</a:t>
             </a:r>
             <a:endParaRPr lang="en-US" sz="1800">
               <a:latin typeface="Constantia" panose="02030602050306030303" pitchFamily="18" charset="0"/>
@@ -9745,13 +9216,6 @@
       </p:transition>
     </mc:Fallback>
   </mc:AlternateContent>
-  <p:timing>
-    <p:tnLst>
-      <p:par>
-        <p:cTn id="1" dur="indefinite" restart="never" nodeType="tmRoot"/>
-      </p:par>
-    </p:tnLst>
-  </p:timing>
 </p:sld>
 </file>
 
@@ -9927,13 +9391,6 @@
       </p:transition>
     </mc:Fallback>
   </mc:AlternateContent>
-  <p:timing>
-    <p:tnLst>
-      <p:par>
-        <p:cTn id="1" dur="indefinite" restart="never" nodeType="tmRoot"/>
-      </p:par>
-    </p:tnLst>
-  </p:timing>
 </p:sld>
 </file>
 
@@ -10002,16 +9459,12 @@
               <a:t>Gắn kết thêm một số tính năng cho đối tượng một cách linh động. Mẫu trang trí </a:t>
             </a:r>
             <a:r>
-              <a:rPr lang="en-US" sz="2000" i="1" smtClean="0"/>
+              <a:rPr lang="en-US" sz="2000" i="1"/>
               <a:t>-</a:t>
             </a:r>
             <a:r>
-              <a:rPr lang="vi-VN" sz="2000" i="1" smtClean="0"/>
-              <a:t>Decorator </a:t>
-            </a:r>
-            <a:r>
               <a:rPr lang="vi-VN" sz="2000" i="1"/>
-              <a:t>cung cấp một phương pháp linh hoạt hơn là sử dụng lớp con để mở rộng chức năng cho đối tượng</a:t>
+              <a:t>Decorator cung cấp một phương pháp linh hoạt hơn là sử dụng lớp con để mở rộng chức năng cho đối tượng</a:t>
             </a:r>
             <a:r>
               <a:rPr lang="en-US" sz="2000"/>
@@ -10218,7 +9671,7 @@
           <a:p>
             <a:pPr lvl="1"/>
             <a:r>
-              <a:rPr lang="en-US" smtClean="0"/>
+              <a:rPr lang="en-US"/>
               <a:t>Xây dựng các hệ thống có tình tùy chọn cao, mỗi tùy chọn có thể có nhiều tùy chọn con. Ví dụ như hệ thống control của Windows Form.</a:t>
             </a:r>
           </a:p>

</xml_diff>